<commit_message>
Fixed bug in the control mechanism intended to prevent customers from accidentally submitting multiple payments. The bug would cause the customer to be transferred directly to the "Payment Completed" page upon 2nd attempt at paying with a stored card.
Added illustration of mPoint's 3-D Secure flow.

git-svn-id: svn://svn.cellpointmobile.com/mpoint/server/trunk@106 86c063f6-31ef-4d33-b9ba-d2d3e4924f03
</commit_message>
<xml_diff>
--- a/doc/mPoint - 3D Secure.pptx
+++ b/doc/mPoint - 3D Secure.pptx
@@ -193,7 +193,7 @@
             <a:fld id="{ADFF7B88-26EB-4FFC-A58B-B49976A7F053}" type="datetimeFigureOut">
               <a:rPr lang="da-DK" smtClean="0"/>
               <a:pPr/>
-              <a:t>16-05-2011</a:t>
+              <a:t>07-12-2011</a:t>
             </a:fld>
             <a:endParaRPr lang="en-GB"/>
           </a:p>
@@ -6405,14 +6405,7 @@
                   <a:latin typeface="Helvetica" pitchFamily="34" charset="0"/>
                   <a:cs typeface="Helvetica" pitchFamily="34" charset="0"/>
                 </a:rPr>
-                <a:t>Select </a:t>
-              </a:r>
-              <a:r>
-                <a:rPr lang="en-GB" sz="1600" b="1" dirty="0" smtClean="0">
-                  <a:latin typeface="Helvetica" pitchFamily="34" charset="0"/>
-                  <a:cs typeface="Helvetica" pitchFamily="34" charset="0"/>
-                </a:rPr>
-                <a:t>payment method</a:t>
+                <a:t>Select payment method</a:t>
               </a:r>
               <a:endParaRPr lang="en-GB" sz="1600" b="1" dirty="0">
                 <a:latin typeface="Helvetica" pitchFamily="34" charset="0"/>
@@ -6488,14 +6481,7 @@
                   <a:latin typeface="Helvetica" pitchFamily="34" charset="0"/>
                   <a:cs typeface="Helvetica" pitchFamily="34" charset="0"/>
                 </a:rPr>
-                <a:t>Payment </a:t>
-              </a:r>
-              <a:r>
-                <a:rPr lang="en-GB" sz="1600" b="1" dirty="0" smtClean="0">
-                  <a:latin typeface="Helvetica" pitchFamily="34" charset="0"/>
-                  <a:cs typeface="Helvetica" pitchFamily="34" charset="0"/>
-                </a:rPr>
-                <a:t>completed</a:t>
+                <a:t>Payment completed</a:t>
               </a:r>
               <a:endParaRPr lang="en-GB" sz="1600" b="1" dirty="0">
                 <a:latin typeface="Helvetica" pitchFamily="34" charset="0"/>
@@ -6533,14 +6519,7 @@
                 <a:latin typeface="Helvetica" pitchFamily="34" charset="0"/>
                 <a:cs typeface="Helvetica" pitchFamily="34" charset="0"/>
               </a:rPr>
-              <a:t>Enter </a:t>
-            </a:r>
-            <a:r>
-              <a:rPr lang="en-GB" sz="1600" b="1" dirty="0" smtClean="0">
-                <a:latin typeface="Helvetica" pitchFamily="34" charset="0"/>
-                <a:cs typeface="Helvetica" pitchFamily="34" charset="0"/>
-              </a:rPr>
-              <a:t>card details</a:t>
+              <a:t>Enter card details</a:t>
             </a:r>
             <a:endParaRPr lang="en-GB" sz="1600" b="1" dirty="0">
               <a:latin typeface="Helvetica" pitchFamily="34" charset="0"/>
@@ -6577,14 +6556,7 @@
                 <a:latin typeface="Helvetica" pitchFamily="34" charset="0"/>
                 <a:cs typeface="Helvetica" pitchFamily="34" charset="0"/>
               </a:rPr>
-              <a:t>Authorise </a:t>
-            </a:r>
-            <a:r>
-              <a:rPr lang="en-GB" sz="1600" b="1" dirty="0" smtClean="0">
-                <a:latin typeface="Helvetica" pitchFamily="34" charset="0"/>
-                <a:cs typeface="Helvetica" pitchFamily="34" charset="0"/>
-              </a:rPr>
-              <a:t>payment</a:t>
+              <a:t>Authorise payment</a:t>
             </a:r>
             <a:endParaRPr lang="en-GB" sz="1600" b="1" dirty="0">
               <a:latin typeface="Helvetica" pitchFamily="34" charset="0"/>
@@ -7101,10 +7073,10 @@
         </p:nvGrpSpPr>
         <p:grpSpPr>
           <a:xfrm>
-            <a:off x="5421053" y="2300099"/>
-            <a:ext cx="1823775" cy="2796118"/>
+            <a:off x="5421052" y="2300099"/>
+            <a:ext cx="1823776" cy="2796118"/>
             <a:chOff x="4860032" y="1774557"/>
-            <a:chExt cx="1683485" cy="2796118"/>
+            <a:chExt cx="1683486" cy="2796118"/>
           </a:xfrm>
         </p:grpSpPr>
         <p:pic>

</xml_diff>

<commit_message>
Fixed bug in method: notifyClient from class: PayEx, which now sends the transaction amount.
Renamed method: getIDFromOrderRef to: getIDFromExternalID in class: PayEx and updated the Callback Controller: /callback/payex.php accordingly.

Fixed bug in method: complete from class: PayEx, which now resets the external id for the transaction before completing it to change the External ID from PayEx's Order Reference to Transaction Number in accordance with their documentation.

Ported method: valState to class: Validate from the mRetail Server.

Performed extensive code clean-up of method: valCPR from class: Validate.

git-svn-id: svn://svn.cellpointmobile.com/mpoint/server/trunk@290 86c063f6-31ef-4d33-b9ba-d2d3e4924f03
</commit_message>
<xml_diff>
--- a/doc/mPoint - 3D Secure.pptx
+++ b/doc/mPoint - 3D Secure.pptx
@@ -5,10 +5,12 @@
     <p:sldMasterId id="2147483648" r:id="rId1"/>
   </p:sldMasterIdLst>
   <p:notesMasterIdLst>
-    <p:notesMasterId r:id="rId3"/>
+    <p:notesMasterId r:id="rId5"/>
   </p:notesMasterIdLst>
   <p:sldIdLst>
     <p:sldId id="352" r:id="rId2"/>
+    <p:sldId id="353" r:id="rId3"/>
+    <p:sldId id="354" r:id="rId4"/>
   </p:sldIdLst>
   <p:sldSz cx="9906000" cy="6858000" type="A4"/>
   <p:notesSz cx="6858000" cy="9144000"/>
@@ -193,7 +195,7 @@
             <a:fld id="{ADFF7B88-26EB-4FFC-A58B-B49976A7F053}" type="datetimeFigureOut">
               <a:rPr lang="da-DK" smtClean="0"/>
               <a:pPr/>
-              <a:t>07-12-2011</a:t>
+              <a:t>21-06-2013</a:t>
             </a:fld>
             <a:endParaRPr lang="en-GB"/>
           </a:p>
@@ -7268,7 +7270,7 @@
               <a:rPr lang="en-US" dirty="0" smtClean="0">
                 <a:ea typeface="ＭＳ Ｐゴシック" pitchFamily="34" charset="-128"/>
               </a:rPr>
-              <a:t>3D </a:t>
+              <a:t>Non-Optimized 3D </a:t>
             </a:r>
             <a:r>
               <a:rPr lang="en-US" dirty="0" err="1" smtClean="0">
@@ -7805,6 +7807,878 @@
       <p:bldP spid="55" grpId="0" animBg="1"/>
     </p:bldLst>
   </p:timing>
+</p:sld>
+</file>
+
+<file path=ppt/slides/slide2.xml><?xml version="1.0" encoding="utf-8"?>
+<p:sld xmlns:a="http://schemas.openxmlformats.org/drawingml/2006/main" xmlns:r="http://schemas.openxmlformats.org/officeDocument/2006/relationships" xmlns:p="http://schemas.openxmlformats.org/presentationml/2006/main">
+  <p:cSld>
+    <p:spTree>
+      <p:nvGrpSpPr>
+        <p:cNvPr id="1" name=""/>
+        <p:cNvGrpSpPr/>
+        <p:nvPr/>
+      </p:nvGrpSpPr>
+      <p:grpSpPr>
+        <a:xfrm>
+          <a:off x="0" y="0"/>
+          <a:ext cx="0" cy="0"/>
+          <a:chOff x="0" y="0"/>
+          <a:chExt cx="0" cy="0"/>
+        </a:xfrm>
+      </p:grpSpPr>
+      <p:sp>
+        <p:nvSpPr>
+          <p:cNvPr id="3" name="Title 2"/>
+          <p:cNvSpPr>
+            <a:spLocks noGrp="1"/>
+          </p:cNvSpPr>
+          <p:nvPr>
+            <p:ph type="ctrTitle"/>
+          </p:nvPr>
+        </p:nvSpPr>
+        <p:spPr/>
+        <p:txBody>
+          <a:bodyPr/>
+          <a:lstStyle/>
+          <a:p>
+            <a:r>
+              <a:rPr lang="en-US" dirty="0" smtClean="0">
+                <a:ea typeface="ＭＳ Ｐゴシック" pitchFamily="34" charset="-128"/>
+              </a:rPr>
+              <a:t>Mobile Optimized </a:t>
+            </a:r>
+            <a:r>
+              <a:rPr lang="en-US" dirty="0" smtClean="0">
+                <a:ea typeface="ＭＳ Ｐゴシック" pitchFamily="34" charset="-128"/>
+              </a:rPr>
+              <a:t>3D </a:t>
+            </a:r>
+            <a:r>
+              <a:rPr lang="en-US" dirty="0" err="1" smtClean="0">
+                <a:ea typeface="ＭＳ Ｐゴシック" pitchFamily="34" charset="-128"/>
+              </a:rPr>
+              <a:t>SEcure</a:t>
+            </a:r>
+            <a:endParaRPr lang="da-DK" dirty="0"/>
+          </a:p>
+        </p:txBody>
+      </p:sp>
+      <p:pic>
+        <p:nvPicPr>
+          <p:cNvPr id="1026" name="Picture 2" descr="D:\Development\mPoint\server\doc\Screenshots\Native - Select Payment Method.png"/>
+          <p:cNvPicPr>
+            <a:picLocks noChangeAspect="1" noChangeArrowheads="1"/>
+          </p:cNvPicPr>
+          <p:nvPr/>
+        </p:nvPicPr>
+        <p:blipFill>
+          <a:blip r:embed="rId2" cstate="print"/>
+          <a:srcRect/>
+          <a:stretch>
+            <a:fillRect/>
+          </a:stretch>
+        </p:blipFill>
+        <p:spPr bwMode="auto">
+          <a:xfrm>
+            <a:off x="464980" y="1340768"/>
+            <a:ext cx="1679708" cy="2520000"/>
+          </a:xfrm>
+          <a:prstGeom prst="rect">
+            <a:avLst/>
+          </a:prstGeom>
+          <a:noFill/>
+        </p:spPr>
+      </p:pic>
+      <p:pic>
+        <p:nvPicPr>
+          <p:cNvPr id="1027" name="Picture 3" descr="D:\Development\mPoint\server\doc\Screenshots\Native - Confirm using 3D Secure.png"/>
+          <p:cNvPicPr>
+            <a:picLocks noChangeAspect="1" noChangeArrowheads="1"/>
+          </p:cNvPicPr>
+          <p:nvPr/>
+        </p:nvPicPr>
+        <p:blipFill>
+          <a:blip r:embed="rId3" cstate="print"/>
+          <a:srcRect/>
+          <a:stretch>
+            <a:fillRect/>
+          </a:stretch>
+        </p:blipFill>
+        <p:spPr bwMode="auto">
+          <a:xfrm>
+            <a:off x="5817096" y="1340768"/>
+            <a:ext cx="1680000" cy="2520000"/>
+          </a:xfrm>
+          <a:prstGeom prst="rect">
+            <a:avLst/>
+          </a:prstGeom>
+          <a:noFill/>
+        </p:spPr>
+      </p:pic>
+      <p:pic>
+        <p:nvPicPr>
+          <p:cNvPr id="1028" name="Picture 4" descr="D:\Development\mPoint\server\doc\Screenshots\Native - Enter Card Details.png"/>
+          <p:cNvPicPr>
+            <a:picLocks noChangeAspect="1" noChangeArrowheads="1"/>
+          </p:cNvPicPr>
+          <p:nvPr/>
+        </p:nvPicPr>
+        <p:blipFill>
+          <a:blip r:embed="rId4" cstate="print"/>
+          <a:srcRect/>
+          <a:stretch>
+            <a:fillRect/>
+          </a:stretch>
+        </p:blipFill>
+        <p:spPr bwMode="auto">
+          <a:xfrm>
+            <a:off x="3080792" y="1340768"/>
+            <a:ext cx="1680000" cy="2520000"/>
+          </a:xfrm>
+          <a:prstGeom prst="rect">
+            <a:avLst/>
+          </a:prstGeom>
+          <a:noFill/>
+        </p:spPr>
+      </p:pic>
+      <p:sp>
+        <p:nvSpPr>
+          <p:cNvPr id="12" name="TextBox 11"/>
+          <p:cNvSpPr txBox="1"/>
+          <p:nvPr/>
+        </p:nvSpPr>
+        <p:spPr>
+          <a:xfrm>
+            <a:off x="-9553" y="3862800"/>
+            <a:ext cx="2544284" cy="338554"/>
+          </a:xfrm>
+          <a:prstGeom prst="rect">
+            <a:avLst/>
+          </a:prstGeom>
+          <a:noFill/>
+        </p:spPr>
+        <p:txBody>
+          <a:bodyPr wrap="square" lIns="0" rIns="0" rtlCol="0">
+            <a:spAutoFit/>
+          </a:bodyPr>
+          <a:lstStyle/>
+          <a:p>
+            <a:pPr algn="ctr"/>
+            <a:r>
+              <a:rPr lang="en-GB" sz="1600" b="1" dirty="0" smtClean="0">
+                <a:latin typeface="Helvetica" pitchFamily="34" charset="0"/>
+                <a:cs typeface="Helvetica" pitchFamily="34" charset="0"/>
+              </a:rPr>
+              <a:t>Select payment method</a:t>
+            </a:r>
+            <a:endParaRPr lang="en-GB" sz="1600" b="1" dirty="0">
+              <a:latin typeface="Helvetica" pitchFamily="34" charset="0"/>
+              <a:cs typeface="Helvetica" pitchFamily="34" charset="0"/>
+            </a:endParaRPr>
+          </a:p>
+        </p:txBody>
+      </p:sp>
+      <p:sp>
+        <p:nvSpPr>
+          <p:cNvPr id="13" name="TextBox 12"/>
+          <p:cNvSpPr txBox="1"/>
+          <p:nvPr/>
+        </p:nvSpPr>
+        <p:spPr>
+          <a:xfrm>
+            <a:off x="2792760" y="3862800"/>
+            <a:ext cx="2376264" cy="338554"/>
+          </a:xfrm>
+          <a:prstGeom prst="rect">
+            <a:avLst/>
+          </a:prstGeom>
+          <a:noFill/>
+        </p:spPr>
+        <p:txBody>
+          <a:bodyPr wrap="square" lIns="0" rIns="0" rtlCol="0">
+            <a:spAutoFit/>
+          </a:bodyPr>
+          <a:lstStyle/>
+          <a:p>
+            <a:pPr algn="ctr"/>
+            <a:r>
+              <a:rPr lang="en-GB" sz="1600" b="1" dirty="0" smtClean="0">
+                <a:latin typeface="Helvetica" pitchFamily="34" charset="0"/>
+                <a:cs typeface="Helvetica" pitchFamily="34" charset="0"/>
+              </a:rPr>
+              <a:t>Enter card details</a:t>
+            </a:r>
+            <a:endParaRPr lang="en-GB" sz="1600" b="1" dirty="0">
+              <a:latin typeface="Helvetica" pitchFamily="34" charset="0"/>
+              <a:cs typeface="Helvetica" pitchFamily="34" charset="0"/>
+            </a:endParaRPr>
+          </a:p>
+        </p:txBody>
+      </p:sp>
+      <p:sp>
+        <p:nvSpPr>
+          <p:cNvPr id="14" name="TextBox 13"/>
+          <p:cNvSpPr txBox="1"/>
+          <p:nvPr/>
+        </p:nvSpPr>
+        <p:spPr>
+          <a:xfrm>
+            <a:off x="5745088" y="3861048"/>
+            <a:ext cx="1794199" cy="338554"/>
+          </a:xfrm>
+          <a:prstGeom prst="rect">
+            <a:avLst/>
+          </a:prstGeom>
+          <a:noFill/>
+        </p:spPr>
+        <p:txBody>
+          <a:bodyPr wrap="square" lIns="0" rIns="0" rtlCol="0">
+            <a:spAutoFit/>
+          </a:bodyPr>
+          <a:lstStyle/>
+          <a:p>
+            <a:pPr algn="ctr"/>
+            <a:r>
+              <a:rPr lang="en-GB" sz="1600" b="1" dirty="0" smtClean="0">
+                <a:latin typeface="Helvetica" pitchFamily="34" charset="0"/>
+                <a:cs typeface="Helvetica" pitchFamily="34" charset="0"/>
+              </a:rPr>
+              <a:t>3D Secure auth</a:t>
+            </a:r>
+            <a:endParaRPr lang="en-GB" sz="1600" b="1" dirty="0">
+              <a:latin typeface="Helvetica" pitchFamily="34" charset="0"/>
+              <a:cs typeface="Helvetica" pitchFamily="34" charset="0"/>
+            </a:endParaRPr>
+          </a:p>
+        </p:txBody>
+      </p:sp>
+      <p:cxnSp>
+        <p:nvCxnSpPr>
+          <p:cNvPr id="15" name="Straight Arrow Connector 14"/>
+          <p:cNvCxnSpPr>
+            <a:stCxn id="1026" idx="3"/>
+            <a:endCxn id="1028" idx="1"/>
+          </p:cNvCxnSpPr>
+          <p:nvPr/>
+        </p:nvCxnSpPr>
+        <p:spPr>
+          <a:xfrm>
+            <a:off x="2144688" y="2600768"/>
+            <a:ext cx="936104" cy="0"/>
+          </a:xfrm>
+          <a:prstGeom prst="straightConnector1">
+            <a:avLst/>
+          </a:prstGeom>
+          <a:ln w="38100">
+            <a:solidFill>
+              <a:schemeClr val="tx1"/>
+            </a:solidFill>
+            <a:headEnd type="none" w="med" len="med"/>
+            <a:tailEnd type="triangle" w="med" len="med"/>
+          </a:ln>
+        </p:spPr>
+        <p:style>
+          <a:lnRef idx="1">
+            <a:schemeClr val="accent1"/>
+          </a:lnRef>
+          <a:fillRef idx="0">
+            <a:schemeClr val="accent1"/>
+          </a:fillRef>
+          <a:effectRef idx="0">
+            <a:schemeClr val="accent1"/>
+          </a:effectRef>
+          <a:fontRef idx="minor">
+            <a:schemeClr val="tx1"/>
+          </a:fontRef>
+        </p:style>
+      </p:cxnSp>
+      <p:cxnSp>
+        <p:nvCxnSpPr>
+          <p:cNvPr id="18" name="Straight Arrow Connector 17"/>
+          <p:cNvCxnSpPr>
+            <a:stCxn id="1028" idx="3"/>
+            <a:endCxn id="1027" idx="1"/>
+          </p:cNvCxnSpPr>
+          <p:nvPr/>
+        </p:nvCxnSpPr>
+        <p:spPr>
+          <a:xfrm>
+            <a:off x="4760792" y="2600768"/>
+            <a:ext cx="1056304" cy="0"/>
+          </a:xfrm>
+          <a:prstGeom prst="straightConnector1">
+            <a:avLst/>
+          </a:prstGeom>
+          <a:ln w="38100">
+            <a:solidFill>
+              <a:schemeClr val="tx1"/>
+            </a:solidFill>
+            <a:headEnd type="none" w="med" len="med"/>
+            <a:tailEnd type="triangle" w="med" len="med"/>
+          </a:ln>
+        </p:spPr>
+        <p:style>
+          <a:lnRef idx="1">
+            <a:schemeClr val="accent1"/>
+          </a:lnRef>
+          <a:fillRef idx="0">
+            <a:schemeClr val="accent1"/>
+          </a:fillRef>
+          <a:effectRef idx="0">
+            <a:schemeClr val="accent1"/>
+          </a:effectRef>
+          <a:fontRef idx="minor">
+            <a:schemeClr val="tx1"/>
+          </a:fontRef>
+        </p:style>
+      </p:cxnSp>
+    </p:spTree>
+  </p:cSld>
+  <p:clrMapOvr>
+    <a:masterClrMapping/>
+  </p:clrMapOvr>
+  <p:timing>
+    <p:tnLst>
+      <p:par>
+        <p:cTn id="1" dur="indefinite" restart="never" nodeType="tmRoot"/>
+      </p:par>
+    </p:tnLst>
+  </p:timing>
+</p:sld>
+</file>
+
+<file path=ppt/slides/slide3.xml><?xml version="1.0" encoding="utf-8"?>
+<p:sld xmlns:a="http://schemas.openxmlformats.org/drawingml/2006/main" xmlns:r="http://schemas.openxmlformats.org/officeDocument/2006/relationships" xmlns:p="http://schemas.openxmlformats.org/presentationml/2006/main">
+  <p:cSld>
+    <p:spTree>
+      <p:nvGrpSpPr>
+        <p:cNvPr id="1" name=""/>
+        <p:cNvGrpSpPr/>
+        <p:nvPr/>
+      </p:nvGrpSpPr>
+      <p:grpSpPr>
+        <a:xfrm>
+          <a:off x="0" y="0"/>
+          <a:ext cx="0" cy="0"/>
+          <a:chOff x="0" y="0"/>
+          <a:chExt cx="0" cy="0"/>
+        </a:xfrm>
+      </p:grpSpPr>
+      <p:sp>
+        <p:nvSpPr>
+          <p:cNvPr id="3" name="Title 2"/>
+          <p:cNvSpPr>
+            <a:spLocks noGrp="1"/>
+          </p:cNvSpPr>
+          <p:nvPr>
+            <p:ph type="ctrTitle"/>
+          </p:nvPr>
+        </p:nvSpPr>
+        <p:spPr/>
+        <p:txBody>
+          <a:bodyPr/>
+          <a:lstStyle/>
+          <a:p>
+            <a:r>
+              <a:rPr lang="da-DK" dirty="0" err="1" smtClean="0"/>
+              <a:t>Payment</a:t>
+            </a:r>
+            <a:r>
+              <a:rPr lang="da-DK" dirty="0" smtClean="0"/>
+              <a:t> options</a:t>
+            </a:r>
+            <a:endParaRPr lang="da-DK" dirty="0"/>
+          </a:p>
+        </p:txBody>
+      </p:sp>
+      <p:graphicFrame>
+        <p:nvGraphicFramePr>
+          <p:cNvPr id="4" name="Table 3"/>
+          <p:cNvGraphicFramePr>
+            <a:graphicFrameLocks noGrp="1"/>
+          </p:cNvGraphicFramePr>
+          <p:nvPr/>
+        </p:nvGraphicFramePr>
+        <p:xfrm>
+          <a:off x="200472" y="1081544"/>
+          <a:ext cx="9433048" cy="1483360"/>
+        </p:xfrm>
+        <a:graphic>
+          <a:graphicData uri="http://schemas.openxmlformats.org/drawingml/2006/table">
+            <a:tbl>
+              <a:tblPr firstRow="1" bandRow="1">
+                <a:tableStyleId>{5C22544A-7EE6-4342-B048-85BDC9FD1C3A}</a:tableStyleId>
+              </a:tblPr>
+              <a:tblGrid>
+                <a:gridCol w="2358262"/>
+                <a:gridCol w="2358262"/>
+                <a:gridCol w="2358262"/>
+                <a:gridCol w="2358262"/>
+              </a:tblGrid>
+              <a:tr h="370840">
+                <a:tc>
+                  <a:txBody>
+                    <a:bodyPr/>
+                    <a:lstStyle/>
+                    <a:p>
+                      <a:r>
+                        <a:rPr lang="da-DK" dirty="0" err="1" smtClean="0"/>
+                        <a:t>Payment</a:t>
+                      </a:r>
+                      <a:r>
+                        <a:rPr lang="da-DK" baseline="0" dirty="0" smtClean="0"/>
+                        <a:t> Solution</a:t>
+                      </a:r>
+                      <a:endParaRPr lang="da-DK" dirty="0"/>
+                    </a:p>
+                  </a:txBody>
+                  <a:tcPr/>
+                </a:tc>
+                <a:tc>
+                  <a:txBody>
+                    <a:bodyPr/>
+                    <a:lstStyle/>
+                    <a:p>
+                      <a:pPr algn="ctr"/>
+                      <a:r>
+                        <a:rPr lang="da-DK" dirty="0" err="1" smtClean="0"/>
+                        <a:t>Setup</a:t>
+                      </a:r>
+                      <a:endParaRPr lang="da-DK" dirty="0"/>
+                    </a:p>
+                  </a:txBody>
+                  <a:tcPr/>
+                </a:tc>
+                <a:tc>
+                  <a:txBody>
+                    <a:bodyPr/>
+                    <a:lstStyle/>
+                    <a:p>
+                      <a:pPr algn="ctr"/>
+                      <a:r>
+                        <a:rPr lang="da-DK" dirty="0" err="1" smtClean="0"/>
+                        <a:t>License</a:t>
+                      </a:r>
+                      <a:endParaRPr lang="da-DK" dirty="0"/>
+                    </a:p>
+                  </a:txBody>
+                  <a:tcPr/>
+                </a:tc>
+                <a:tc>
+                  <a:txBody>
+                    <a:bodyPr/>
+                    <a:lstStyle/>
+                    <a:p>
+                      <a:pPr algn="ctr"/>
+                      <a:r>
+                        <a:rPr lang="da-DK" dirty="0" err="1" smtClean="0"/>
+                        <a:t>Transaction</a:t>
+                      </a:r>
+                      <a:endParaRPr lang="da-DK" dirty="0"/>
+                    </a:p>
+                  </a:txBody>
+                  <a:tcPr/>
+                </a:tc>
+              </a:tr>
+              <a:tr h="370840">
+                <a:tc>
+                  <a:txBody>
+                    <a:bodyPr/>
+                    <a:lstStyle/>
+                    <a:p>
+                      <a:r>
+                        <a:rPr lang="da-DK" dirty="0" err="1" smtClean="0"/>
+                        <a:t>WorldPay</a:t>
+                      </a:r>
+                      <a:endParaRPr lang="da-DK" dirty="0"/>
+                    </a:p>
+                  </a:txBody>
+                  <a:tcPr/>
+                </a:tc>
+                <a:tc>
+                  <a:txBody>
+                    <a:bodyPr/>
+                    <a:lstStyle/>
+                    <a:p>
+                      <a:pPr algn="ctr"/>
+                      <a:r>
+                        <a:rPr lang="da-DK" dirty="0" smtClean="0"/>
+                        <a:t>X</a:t>
+                      </a:r>
+                      <a:endParaRPr lang="da-DK" dirty="0"/>
+                    </a:p>
+                  </a:txBody>
+                  <a:tcPr/>
+                </a:tc>
+                <a:tc>
+                  <a:txBody>
+                    <a:bodyPr/>
+                    <a:lstStyle/>
+                    <a:p>
+                      <a:pPr algn="ctr"/>
+                      <a:r>
+                        <a:rPr lang="da-DK" dirty="0" smtClean="0"/>
+                        <a:t>X</a:t>
+                      </a:r>
+                      <a:endParaRPr lang="da-DK" dirty="0"/>
+                    </a:p>
+                  </a:txBody>
+                  <a:tcPr/>
+                </a:tc>
+                <a:tc>
+                  <a:txBody>
+                    <a:bodyPr/>
+                    <a:lstStyle/>
+                    <a:p>
+                      <a:pPr algn="ctr"/>
+                      <a:r>
+                        <a:rPr lang="da-DK" dirty="0" smtClean="0"/>
+                        <a:t>X</a:t>
+                      </a:r>
+                      <a:endParaRPr lang="da-DK" dirty="0"/>
+                    </a:p>
+                  </a:txBody>
+                  <a:tcPr/>
+                </a:tc>
+              </a:tr>
+              <a:tr h="370840">
+                <a:tc>
+                  <a:txBody>
+                    <a:bodyPr/>
+                    <a:lstStyle/>
+                    <a:p>
+                      <a:r>
+                        <a:rPr lang="da-DK" dirty="0" err="1" smtClean="0"/>
+                        <a:t>Other</a:t>
+                      </a:r>
+                      <a:r>
+                        <a:rPr lang="da-DK" dirty="0" smtClean="0"/>
+                        <a:t> PSP</a:t>
+                      </a:r>
+                      <a:endParaRPr lang="da-DK" dirty="0"/>
+                    </a:p>
+                  </a:txBody>
+                  <a:tcPr/>
+                </a:tc>
+                <a:tc>
+                  <a:txBody>
+                    <a:bodyPr/>
+                    <a:lstStyle/>
+                    <a:p>
+                      <a:pPr algn="ctr"/>
+                      <a:r>
+                        <a:rPr lang="da-DK" dirty="0" smtClean="0"/>
+                        <a:t>X</a:t>
+                      </a:r>
+                      <a:endParaRPr lang="da-DK" dirty="0"/>
+                    </a:p>
+                  </a:txBody>
+                  <a:tcPr/>
+                </a:tc>
+                <a:tc>
+                  <a:txBody>
+                    <a:bodyPr/>
+                    <a:lstStyle/>
+                    <a:p>
+                      <a:pPr algn="ctr"/>
+                      <a:r>
+                        <a:rPr lang="da-DK" dirty="0" smtClean="0"/>
+                        <a:t>X</a:t>
+                      </a:r>
+                      <a:endParaRPr lang="da-DK" dirty="0"/>
+                    </a:p>
+                  </a:txBody>
+                  <a:tcPr/>
+                </a:tc>
+                <a:tc>
+                  <a:txBody>
+                    <a:bodyPr/>
+                    <a:lstStyle/>
+                    <a:p>
+                      <a:pPr algn="ctr"/>
+                      <a:r>
+                        <a:rPr lang="da-DK" dirty="0" smtClean="0"/>
+                        <a:t>X</a:t>
+                      </a:r>
+                      <a:endParaRPr lang="da-DK" dirty="0"/>
+                    </a:p>
+                  </a:txBody>
+                  <a:tcPr/>
+                </a:tc>
+              </a:tr>
+              <a:tr h="370840">
+                <a:tc>
+                  <a:txBody>
+                    <a:bodyPr/>
+                    <a:lstStyle/>
+                    <a:p>
+                      <a:r>
+                        <a:rPr lang="da-DK" dirty="0" err="1" smtClean="0"/>
+                        <a:t>Standalone</a:t>
+                      </a:r>
+                      <a:endParaRPr lang="da-DK" dirty="0"/>
+                    </a:p>
+                  </a:txBody>
+                  <a:tcPr/>
+                </a:tc>
+                <a:tc>
+                  <a:txBody>
+                    <a:bodyPr/>
+                    <a:lstStyle/>
+                    <a:p>
+                      <a:pPr algn="ctr"/>
+                      <a:r>
+                        <a:rPr lang="da-DK" dirty="0" smtClean="0"/>
+                        <a:t>X</a:t>
+                      </a:r>
+                      <a:endParaRPr lang="da-DK" dirty="0"/>
+                    </a:p>
+                  </a:txBody>
+                  <a:tcPr/>
+                </a:tc>
+                <a:tc>
+                  <a:txBody>
+                    <a:bodyPr/>
+                    <a:lstStyle/>
+                    <a:p>
+                      <a:pPr algn="ctr"/>
+                      <a:r>
+                        <a:rPr lang="da-DK" dirty="0" smtClean="0"/>
+                        <a:t>X</a:t>
+                      </a:r>
+                      <a:endParaRPr lang="da-DK" dirty="0"/>
+                    </a:p>
+                  </a:txBody>
+                  <a:tcPr/>
+                </a:tc>
+                <a:tc>
+                  <a:txBody>
+                    <a:bodyPr/>
+                    <a:lstStyle/>
+                    <a:p>
+                      <a:pPr algn="ctr"/>
+                      <a:endParaRPr lang="da-DK" dirty="0"/>
+                    </a:p>
+                  </a:txBody>
+                  <a:tcPr/>
+                </a:tc>
+              </a:tr>
+            </a:tbl>
+          </a:graphicData>
+        </a:graphic>
+      </p:graphicFrame>
+      <p:sp>
+        <p:nvSpPr>
+          <p:cNvPr id="5" name="TextBox 4"/>
+          <p:cNvSpPr txBox="1"/>
+          <p:nvPr/>
+        </p:nvSpPr>
+        <p:spPr>
+          <a:xfrm>
+            <a:off x="200472" y="2636912"/>
+            <a:ext cx="9433048" cy="3970318"/>
+          </a:xfrm>
+          <a:prstGeom prst="rect">
+            <a:avLst/>
+          </a:prstGeom>
+          <a:noFill/>
+        </p:spPr>
+        <p:txBody>
+          <a:bodyPr wrap="square" rtlCol="0">
+            <a:spAutoFit/>
+          </a:bodyPr>
+          <a:lstStyle/>
+          <a:p>
+            <a:r>
+              <a:rPr lang="en-US" sz="1400" b="1" dirty="0" smtClean="0"/>
+              <a:t>What are the benefits of Verified by Visa, MasterCard </a:t>
+            </a:r>
+            <a:r>
+              <a:rPr lang="en-US" sz="1400" b="1" dirty="0" err="1" smtClean="0"/>
+              <a:t>SecureCode</a:t>
+            </a:r>
+            <a:r>
+              <a:rPr lang="en-US" sz="1400" b="1" dirty="0" smtClean="0"/>
+              <a:t> and JCB J/Secure programs for YOU?</a:t>
+            </a:r>
+            <a:endParaRPr lang="en-US" sz="1400" dirty="0" smtClean="0"/>
+          </a:p>
+          <a:p>
+            <a:pPr marL="180000" indent="-180000">
+              <a:buFont typeface="Arial" pitchFamily="34" charset="0"/>
+              <a:buChar char="•"/>
+            </a:pPr>
+            <a:r>
+              <a:rPr lang="en-US" sz="1400" dirty="0" smtClean="0"/>
+              <a:t>When you process transactions using Click2Sell 3-D Secure feature, you will be 95%+ protected from the </a:t>
+            </a:r>
+            <a:r>
+              <a:rPr lang="en-US" sz="1400" dirty="0" err="1" smtClean="0"/>
+              <a:t>chargebacks</a:t>
+            </a:r>
+            <a:r>
+              <a:rPr lang="en-US" sz="1400" dirty="0" smtClean="0"/>
+              <a:t>.</a:t>
+            </a:r>
+          </a:p>
+          <a:p>
+            <a:pPr marL="180000" indent="-180000">
+              <a:buFont typeface="Arial" pitchFamily="34" charset="0"/>
+              <a:buChar char="•"/>
+            </a:pPr>
+            <a:r>
+              <a:rPr lang="en-US" sz="1400" dirty="0" smtClean="0"/>
+              <a:t>You are not liable for </a:t>
+            </a:r>
+            <a:r>
+              <a:rPr lang="en-US" sz="1400" dirty="0" err="1" smtClean="0"/>
+              <a:t>chargebacks</a:t>
+            </a:r>
+            <a:r>
+              <a:rPr lang="en-US" sz="1400" dirty="0" smtClean="0"/>
+              <a:t> that result from fraudulent unauthorized use of Visa, </a:t>
+            </a:r>
+            <a:r>
+              <a:rPr lang="en-US" sz="1400" dirty="0" err="1" smtClean="0"/>
+              <a:t>Mastercard</a:t>
+            </a:r>
+            <a:r>
+              <a:rPr lang="en-US" sz="1400" dirty="0" smtClean="0"/>
+              <a:t> or JCB cards.</a:t>
+            </a:r>
+          </a:p>
+          <a:p>
+            <a:pPr marL="180000" indent="-180000">
+              <a:buFont typeface="Arial" pitchFamily="34" charset="0"/>
+              <a:buChar char="•"/>
+            </a:pPr>
+            <a:r>
+              <a:rPr lang="en-US" sz="1400" dirty="0" smtClean="0"/>
+              <a:t>Fraud on your website is reduced since 3-D Secure protection saves you from unauthorized card use</a:t>
+            </a:r>
+          </a:p>
+          <a:p>
+            <a:pPr marL="180000" indent="-180000">
+              <a:buFont typeface="Arial" pitchFamily="34" charset="0"/>
+              <a:buChar char="•"/>
+            </a:pPr>
+            <a:r>
+              <a:rPr lang="en-US" sz="1400" dirty="0" smtClean="0"/>
+              <a:t>Even if chargeback comes later, you are no liable for it and you don’t pay a cent to your vendor account’s bank. No more $20-$30 bills </a:t>
+            </a:r>
+            <a:r>
+              <a:rPr lang="en-US" sz="1400" dirty="0" err="1" smtClean="0"/>
+              <a:t>everytime</a:t>
+            </a:r>
+            <a:r>
+              <a:rPr lang="en-US" sz="1400" dirty="0" smtClean="0"/>
+              <a:t> you receive a chargeback.</a:t>
+            </a:r>
+          </a:p>
+          <a:p>
+            <a:pPr marL="180000" indent="-180000">
+              <a:buFont typeface="Arial" pitchFamily="34" charset="0"/>
+              <a:buChar char="•"/>
+            </a:pPr>
+            <a:r>
+              <a:rPr lang="en-US" sz="1400" dirty="0" smtClean="0"/>
+              <a:t>Visa, MasterCard and JCB protects you in case of </a:t>
+            </a:r>
+            <a:r>
+              <a:rPr lang="en-US" sz="1400" dirty="0" err="1" smtClean="0"/>
+              <a:t>chargebacks</a:t>
+            </a:r>
+            <a:endParaRPr lang="en-US" sz="1400" dirty="0" smtClean="0"/>
+          </a:p>
+          <a:p>
+            <a:pPr marL="180000" indent="-180000">
+              <a:buFont typeface="Arial" pitchFamily="34" charset="0"/>
+              <a:buChar char="•"/>
+            </a:pPr>
+            <a:r>
+              <a:rPr lang="en-US" sz="1400" dirty="0" smtClean="0"/>
+              <a:t>Your customers enjoy a safer place to shop when they see Verified by Visa, MasterCard </a:t>
+            </a:r>
+            <a:r>
+              <a:rPr lang="en-US" sz="1400" dirty="0" err="1" smtClean="0"/>
+              <a:t>SecureCode</a:t>
+            </a:r>
+            <a:r>
+              <a:rPr lang="en-US" sz="1400" dirty="0" smtClean="0"/>
+              <a:t> and JCB J/Secure logos on your product’s checkout pages</a:t>
+            </a:r>
+          </a:p>
+          <a:p>
+            <a:pPr marL="180000" indent="-180000">
+              <a:buFont typeface="Arial" pitchFamily="34" charset="0"/>
+              <a:buChar char="•"/>
+            </a:pPr>
+            <a:r>
+              <a:rPr lang="en-US" sz="1400" dirty="0" smtClean="0"/>
+              <a:t>The transaction costs are reduced at least 0.5%, up to 2%! You can qualify for a lower transaction fees for your e-commerce transactions if you use 3-D Secure protection. So if you are paying 2% or 4% fee for your vendor account provider, you can easily reduce this cost up to 2%. This can save you thousands of dollars every month!</a:t>
+            </a:r>
+          </a:p>
+          <a:p>
+            <a:pPr marL="180000" indent="-180000">
+              <a:buFont typeface="Arial" pitchFamily="34" charset="0"/>
+              <a:buChar char="•"/>
+            </a:pPr>
+            <a:r>
+              <a:rPr lang="en-US" sz="1400" dirty="0" smtClean="0"/>
+              <a:t>When you participate in these 3-D Secure programs your customers and their transactions are safe.</a:t>
+            </a:r>
+          </a:p>
+          <a:p>
+            <a:pPr marL="180000" indent="-180000">
+              <a:buFont typeface="Arial" pitchFamily="34" charset="0"/>
+              <a:buChar char="•"/>
+            </a:pPr>
+            <a:r>
+              <a:rPr lang="en-US" sz="1400" dirty="0" smtClean="0"/>
+              <a:t>Expand the geographic reach of your business by selling to customers outside your country without worrying about possible fraud.</a:t>
+            </a:r>
+          </a:p>
+          <a:p>
+            <a:pPr marL="180000" indent="-180000">
+              <a:buFont typeface="Arial" pitchFamily="34" charset="0"/>
+              <a:buChar char="•"/>
+            </a:pPr>
+            <a:r>
+              <a:rPr lang="en-US" sz="1400" dirty="0" smtClean="0"/>
+              <a:t>Advertise your website for free and attract customers on the Visa and MasterCard consumer websites</a:t>
+            </a:r>
+            <a:r>
+              <a:rPr lang="en-US" sz="1400" dirty="0" smtClean="0"/>
+              <a:t>.</a:t>
+            </a:r>
+          </a:p>
+          <a:p>
+            <a:pPr marL="180000" indent="-180000">
+              <a:buFont typeface="Arial" pitchFamily="34" charset="0"/>
+              <a:buChar char="•"/>
+            </a:pPr>
+            <a:endParaRPr lang="en-US" sz="1400" dirty="0" smtClean="0"/>
+          </a:p>
+          <a:p>
+            <a:pPr marL="180000" indent="-180000"/>
+            <a:r>
+              <a:rPr lang="en-US" sz="1400" i="1" dirty="0" smtClean="0"/>
+              <a:t>http://</a:t>
+            </a:r>
+            <a:r>
+              <a:rPr lang="en-US" sz="1400" i="1" dirty="0" smtClean="0"/>
+              <a:t>www.click2sell.eu/en/3d-secure.html</a:t>
+            </a:r>
+            <a:endParaRPr lang="da-DK" sz="1400" dirty="0"/>
+          </a:p>
+        </p:txBody>
+      </p:sp>
+    </p:spTree>
+  </p:cSld>
+  <p:clrMapOvr>
+    <a:masterClrMapping/>
+  </p:clrMapOvr>
 </p:sld>
 </file>
 

</xml_diff>